<commit_message>
Update Week 12-Lecture 1 - Resonance.pptx
</commit_message>
<xml_diff>
--- a/PP WORK/Instructor Version/Week 12/Week 12-Lecture 1 - Resonance.pptx
+++ b/PP WORK/Instructor Version/Week 12/Week 12-Lecture 1 - Resonance.pptx
@@ -126,7 +126,7 @@
   </p:defaultTextStyle>
   <p:extLst>
     <p:ext uri="{EFAFB233-063F-42B5-8137-9DF3F51BA10A}">
-      <p15:sldGuideLst xmlns:p15="http://schemas.microsoft.com/office/powerpoint/2012/main"/>
+      <p15:sldGuideLst xmlns:p15="http://schemas.microsoft.com/office/powerpoint/2012/main" xmlns=""/>
     </p:ext>
   </p:extLst>
 </p:presentation>
@@ -214,7 +214,7 @@
           <a:p>
             <a:fld id="{6677E2BA-0A7C-4BA3-A7E7-5EF52BA21DFA}" type="datetimeFigureOut">
               <a:rPr lang="en-GB" smtClean="0"/>
-              <a:t>08/12/2024</a:t>
+              <a:t>17/01/2025</a:t>
             </a:fld>
             <a:endParaRPr lang="en-GB"/>
           </a:p>
@@ -2440,7 +2440,7 @@
           <a:p>
             <a:fld id="{1D8BD707-D9CF-40AE-B4C6-C98DA3205C09}" type="datetimeFigureOut">
               <a:rPr lang="en-US"/>
-              <a:t>12/8/2024</a:t>
+              <a:t>1/17/2025</a:t>
             </a:fld>
             <a:endParaRPr lang="en-US"/>
           </a:p>
@@ -2610,7 +2610,7 @@
           <a:p>
             <a:fld id="{1D8BD707-D9CF-40AE-B4C6-C98DA3205C09}" type="datetimeFigureOut">
               <a:rPr lang="en-US"/>
-              <a:t>12/8/2024</a:t>
+              <a:t>1/17/2025</a:t>
             </a:fld>
             <a:endParaRPr lang="en-US"/>
           </a:p>
@@ -2823,7 +2823,7 @@
           <a:p>
             <a:fld id="{1D8BD707-D9CF-40AE-B4C6-C98DA3205C09}" type="datetimeFigureOut">
               <a:rPr lang="en-US"/>
-              <a:t>12/8/2024</a:t>
+              <a:t>1/17/2025</a:t>
             </a:fld>
             <a:endParaRPr lang="en-US"/>
           </a:p>
@@ -2970,7 +2970,7 @@
           <a:p>
             <a:fld id="{1D8BD707-D9CF-40AE-B4C6-C98DA3205C09}" type="datetimeFigureOut">
               <a:rPr lang="en-US"/>
-              <a:t>12/8/2024</a:t>
+              <a:t>1/17/2025</a:t>
             </a:fld>
             <a:endParaRPr lang="en-US"/>
           </a:p>
@@ -3043,7 +3043,7 @@
           <p:cNvPr id="2" name="Title 1">
             <a:extLst>
               <a:ext uri="{FF2B5EF4-FFF2-40B4-BE49-F238E27FC236}">
-                <a16:creationId xmlns:a16="http://schemas.microsoft.com/office/drawing/2014/main" id="{8267C4E5-55F7-DB05-186B-06791E1D1784}"/>
+                <a16:creationId xmlns:a16="http://schemas.microsoft.com/office/drawing/2014/main" xmlns="" id="{8267C4E5-55F7-DB05-186B-06791E1D1784}"/>
               </a:ext>
             </a:extLst>
           </p:cNvPr>
@@ -3072,7 +3072,7 @@
           <p:cNvPr id="3" name="Footer Placeholder 2">
             <a:extLst>
               <a:ext uri="{FF2B5EF4-FFF2-40B4-BE49-F238E27FC236}">
-                <a16:creationId xmlns:a16="http://schemas.microsoft.com/office/drawing/2014/main" id="{B3AA35ED-DF99-6958-28FA-33A93BB97722}"/>
+                <a16:creationId xmlns:a16="http://schemas.microsoft.com/office/drawing/2014/main" xmlns="" id="{B3AA35ED-DF99-6958-28FA-33A93BB97722}"/>
               </a:ext>
             </a:extLst>
           </p:cNvPr>
@@ -3097,7 +3097,7 @@
           <p:cNvPr id="4" name="Date Placeholder 3">
             <a:extLst>
               <a:ext uri="{FF2B5EF4-FFF2-40B4-BE49-F238E27FC236}">
-                <a16:creationId xmlns:a16="http://schemas.microsoft.com/office/drawing/2014/main" id="{55503DB0-5264-6061-D4B6-AE3D944FC839}"/>
+                <a16:creationId xmlns:a16="http://schemas.microsoft.com/office/drawing/2014/main" xmlns="" id="{55503DB0-5264-6061-D4B6-AE3D944FC839}"/>
               </a:ext>
             </a:extLst>
           </p:cNvPr>
@@ -3115,7 +3115,7 @@
           <a:p>
             <a:fld id="{1D8BD707-D9CF-40AE-B4C6-C98DA3205C09}" type="datetimeFigureOut">
               <a:rPr lang="en-US" smtClean="0"/>
-              <a:t>12/8/2024</a:t>
+              <a:t>1/17/2025</a:t>
             </a:fld>
             <a:endParaRPr lang="en-US"/>
           </a:p>
@@ -3126,7 +3126,7 @@
           <p:cNvPr id="5" name="Slide Number Placeholder 4">
             <a:extLst>
               <a:ext uri="{FF2B5EF4-FFF2-40B4-BE49-F238E27FC236}">
-                <a16:creationId xmlns:a16="http://schemas.microsoft.com/office/drawing/2014/main" id="{306C615E-9D94-7E15-4EC3-69D6111D00EE}"/>
+                <a16:creationId xmlns:a16="http://schemas.microsoft.com/office/drawing/2014/main" xmlns="" id="{306C615E-9D94-7E15-4EC3-69D6111D00EE}"/>
               </a:ext>
             </a:extLst>
           </p:cNvPr>
@@ -3236,7 +3236,7 @@
           <a:p>
             <a:fld id="{1D8BD707-D9CF-40AE-B4C6-C98DA3205C09}" type="datetimeFigureOut">
               <a:rPr lang="en-US"/>
-              <a:t>12/8/2024</a:t>
+              <a:t>1/17/2025</a:t>
             </a:fld>
             <a:endParaRPr lang="en-US"/>
           </a:p>
@@ -3416,7 +3416,7 @@
           <a:p>
             <a:fld id="{3138BA51-D3EA-CD41-976F-9A9696589CDF}" type="datetimeFigureOut">
               <a:rPr lang="en-US" smtClean="0"/>
-              <a:t>12/8/2024</a:t>
+              <a:t>1/17/2025</a:t>
             </a:fld>
             <a:endParaRPr lang="en-US"/>
           </a:p>
@@ -3672,7 +3672,7 @@
           <p:cNvPr id="25" name="Rectangle 24">
             <a:extLst>
               <a:ext uri="{FF2B5EF4-FFF2-40B4-BE49-F238E27FC236}">
-                <a16:creationId xmlns:a16="http://schemas.microsoft.com/office/drawing/2014/main" id="{669E0535-6FD9-4D8F-80CA-FF7A96DB665F}"/>
+                <a16:creationId xmlns:a16="http://schemas.microsoft.com/office/drawing/2014/main" xmlns="" id="{669E0535-6FD9-4D8F-80CA-FF7A96DB665F}"/>
               </a:ext>
             </a:extLst>
           </p:cNvPr>
@@ -3715,7 +3715,7 @@
           <a:lstStyle/>
           <a:p>
             <a:pPr algn="ctr"/>
-            <a:endParaRPr lang="en-KW" sz="2400"/>
+            <a:endParaRPr lang="x-none" sz="2400"/>
           </a:p>
         </p:txBody>
       </p:sp>
@@ -3724,7 +3724,7 @@
           <p:cNvPr id="26" name="Picture 25" descr="A black and red background with a bird&#10;&#10;Description automatically generated">
             <a:extLst>
               <a:ext uri="{FF2B5EF4-FFF2-40B4-BE49-F238E27FC236}">
-                <a16:creationId xmlns:a16="http://schemas.microsoft.com/office/drawing/2014/main" id="{7356EFA9-D406-4147-B1F7-82B217840839}"/>
+                <a16:creationId xmlns:a16="http://schemas.microsoft.com/office/drawing/2014/main" xmlns="" id="{7356EFA9-D406-4147-B1F7-82B217840839}"/>
               </a:ext>
             </a:extLst>
           </p:cNvPr>
@@ -3754,7 +3754,7 @@
           <p:cNvPr id="27" name="Google Shape;15;p13">
             <a:extLst>
               <a:ext uri="{FF2B5EF4-FFF2-40B4-BE49-F238E27FC236}">
-                <a16:creationId xmlns:a16="http://schemas.microsoft.com/office/drawing/2014/main" id="{F5F3B15A-58C1-48A3-AB6A-E8A3A8F0B1F0}"/>
+                <a16:creationId xmlns:a16="http://schemas.microsoft.com/office/drawing/2014/main" xmlns="" id="{F5F3B15A-58C1-48A3-AB6A-E8A3A8F0B1F0}"/>
               </a:ext>
             </a:extLst>
           </p:cNvPr>
@@ -3920,7 +3920,7 @@
           <p:cNvPr id="28" name="Google Shape;19;p14">
             <a:extLst>
               <a:ext uri="{FF2B5EF4-FFF2-40B4-BE49-F238E27FC236}">
-                <a16:creationId xmlns:a16="http://schemas.microsoft.com/office/drawing/2014/main" id="{A6353D6C-199F-4C21-9FC8-2D00FAAA26A6}"/>
+                <a16:creationId xmlns:a16="http://schemas.microsoft.com/office/drawing/2014/main" xmlns="" id="{A6353D6C-199F-4C21-9FC8-2D00FAAA26A6}"/>
               </a:ext>
             </a:extLst>
           </p:cNvPr>
@@ -4199,7 +4199,7 @@
           <p:cNvPr id="29" name="Google Shape;55;p1">
             <a:extLst>
               <a:ext uri="{FF2B5EF4-FFF2-40B4-BE49-F238E27FC236}">
-                <a16:creationId xmlns:a16="http://schemas.microsoft.com/office/drawing/2014/main" id="{4544F053-DAFF-4191-A4FE-EAC318BF6A0C}"/>
+                <a16:creationId xmlns:a16="http://schemas.microsoft.com/office/drawing/2014/main" xmlns="" id="{4544F053-DAFF-4191-A4FE-EAC318BF6A0C}"/>
               </a:ext>
             </a:extLst>
           </p:cNvPr>
@@ -4271,7 +4271,7 @@
           <p:cNvPr id="2" name="Title 1">
             <a:extLst>
               <a:ext uri="{FF2B5EF4-FFF2-40B4-BE49-F238E27FC236}">
-                <a16:creationId xmlns:a16="http://schemas.microsoft.com/office/drawing/2014/main" id="{7B6E2517-3805-41A0-9280-523D3C8CC82F}"/>
+                <a16:creationId xmlns:a16="http://schemas.microsoft.com/office/drawing/2014/main" xmlns="" id="{7B6E2517-3805-41A0-9280-523D3C8CC82F}"/>
               </a:ext>
             </a:extLst>
           </p:cNvPr>
@@ -4510,7 +4510,7 @@
           <a:p>
             <a:fld id="{1D8BD707-D9CF-40AE-B4C6-C98DA3205C09}" type="datetimeFigureOut">
               <a:rPr lang="en-US"/>
-              <a:t>12/8/2024</a:t>
+              <a:t>1/17/2025</a:t>
             </a:fld>
             <a:endParaRPr lang="en-US"/>
           </a:p>
@@ -4791,7 +4791,7 @@
                   <a:noFill/>
                 </a:ln>
                 <a:solidFill>
-                  <a:srgbClr val="00B050"/>
+                  <a:srgbClr val="0000FF"/>
                 </a:solidFill>
                 <a:effectLst/>
                 <a:uLnTx/>
@@ -4827,7 +4827,7 @@
                   <a:noFill/>
                 </a:ln>
                 <a:solidFill>
-                  <a:srgbClr val="00B050"/>
+                  <a:srgbClr val="0000FF"/>
                 </a:solidFill>
                 <a:effectLst/>
                 <a:uLnTx/>
@@ -4844,7 +4844,7 @@
                   <a:noFill/>
                 </a:ln>
                 <a:solidFill>
-                  <a:srgbClr val="00B050"/>
+                  <a:srgbClr val="0000FF"/>
                 </a:solidFill>
                 <a:effectLst/>
                 <a:uLnTx/>
@@ -4861,7 +4861,7 @@
                   <a:noFill/>
                 </a:ln>
                 <a:solidFill>
-                  <a:srgbClr val="00B050"/>
+                  <a:srgbClr val="0000FF"/>
                 </a:solidFill>
                 <a:effectLst/>
                 <a:uLnTx/>
@@ -4870,15 +4870,15 @@
                 <a:ea typeface="+mn-ea"/>
                 <a:cs typeface="Arial" pitchFamily="34" charset="0"/>
               </a:rPr>
-              <a:t> 20</a:t>
+              <a:t> </a:t>
             </a:r>
             <a:r>
-              <a:rPr kumimoji="0" lang="en-US" sz="3600" b="1" i="0" u="none" strike="noStrike" kern="1200" cap="none" spc="0" normalizeH="0" baseline="0" noProof="0" dirty="0">
+              <a:rPr kumimoji="0" lang="x-none" sz="3600" b="1" i="0" u="none" strike="noStrike" kern="1200" cap="none" spc="0" normalizeH="0" baseline="0" noProof="0">
                 <a:ln>
                   <a:noFill/>
                 </a:ln>
                 <a:solidFill>
-                  <a:srgbClr val="00B050"/>
+                  <a:srgbClr val="0000FF"/>
                 </a:solidFill>
                 <a:effectLst/>
                 <a:uLnTx/>
@@ -4887,8 +4887,39 @@
                 <a:ea typeface="+mn-ea"/>
                 <a:cs typeface="Arial" pitchFamily="34" charset="0"/>
               </a:rPr>
-              <a:t>2</a:t>
+              <a:t>20</a:t>
             </a:r>
+            <a:r>
+              <a:rPr kumimoji="0" lang="en-US" sz="3600" b="1" i="0" u="none" strike="noStrike" kern="1200" cap="none" spc="0" normalizeH="0" baseline="0" noProof="0" dirty="0" smtClean="0">
+                <a:ln>
+                  <a:noFill/>
+                </a:ln>
+                <a:solidFill>
+                  <a:srgbClr val="0000FF"/>
+                </a:solidFill>
+                <a:effectLst/>
+                <a:uLnTx/>
+                <a:uFillTx/>
+                <a:latin typeface="Arial" pitchFamily="34" charset="0"/>
+                <a:ea typeface="+mn-ea"/>
+                <a:cs typeface="Arial" pitchFamily="34" charset="0"/>
+              </a:rPr>
+              <a:t>2 – Spring 2025</a:t>
+            </a:r>
+            <a:endParaRPr kumimoji="0" lang="en-US" sz="3600" b="1" i="0" u="none" strike="noStrike" kern="1200" cap="none" spc="0" normalizeH="0" baseline="0" noProof="0" dirty="0">
+              <a:ln>
+                <a:noFill/>
+              </a:ln>
+              <a:solidFill>
+                <a:srgbClr val="0000FF"/>
+              </a:solidFill>
+              <a:effectLst/>
+              <a:uLnTx/>
+              <a:uFillTx/>
+              <a:latin typeface="Arial" pitchFamily="34" charset="0"/>
+              <a:ea typeface="+mn-ea"/>
+              <a:cs typeface="Arial" pitchFamily="34" charset="0"/>
+            </a:endParaRPr>
           </a:p>
         </p:txBody>
       </p:sp>
@@ -4897,7 +4928,7 @@
           <p:cNvPr id="2" name="TextBox 1">
             <a:extLst>
               <a:ext uri="{FF2B5EF4-FFF2-40B4-BE49-F238E27FC236}">
-                <a16:creationId xmlns:a16="http://schemas.microsoft.com/office/drawing/2014/main" id="{07DEEC26-75A9-F4A2-6948-691F17B753B2}"/>
+                <a16:creationId xmlns:a16="http://schemas.microsoft.com/office/drawing/2014/main" xmlns="" id="{07DEEC26-75A9-F4A2-6948-691F17B753B2}"/>
               </a:ext>
             </a:extLst>
           </p:cNvPr>
@@ -4926,7 +4957,7 @@
             <a:r>
               <a:rPr lang="en-US" sz="4400" b="1" dirty="0">
                 <a:solidFill>
-                  <a:srgbClr val="0000FF"/>
+                  <a:srgbClr val="00B050"/>
                 </a:solidFill>
                 <a:latin typeface="Cambria" panose="02040503050406030204" pitchFamily="18" charset="0"/>
                 <a:ea typeface="Cambria" panose="02040503050406030204" pitchFamily="18" charset="0"/>
@@ -9905,7 +9936,7 @@
                         <m:sSubPr>
                           <m:ctrlPr>
                             <a:rPr lang="en-US" sz="2400" i="1" smtClean="0">
-                              <a:latin typeface="Cambria Math" panose="02040503050406030204" pitchFamily="18" charset="0"/>
+                              <a:latin typeface="Cambria Math"/>
                             </a:rPr>
                           </m:ctrlPr>
                         </m:sSubPr>
@@ -9936,7 +9967,7 @@
                         <m:dPr>
                           <m:ctrlPr>
                             <a:rPr lang="en-US" sz="2400" i="1" smtClean="0">
-                              <a:latin typeface="Cambria Math" panose="02040503050406030204" pitchFamily="18" charset="0"/>
+                              <a:latin typeface="Cambria Math"/>
                             </a:rPr>
                           </m:ctrlPr>
                         </m:dPr>
@@ -9954,7 +9985,7 @@
                             <m:sSubPr>
                               <m:ctrlPr>
                                 <a:rPr lang="en-US" sz="2400" i="1" smtClean="0">
-                                  <a:latin typeface="Cambria Math" panose="02040503050406030204" pitchFamily="18" charset="0"/>
+                                  <a:latin typeface="Cambria Math"/>
                                 </a:rPr>
                               </m:ctrlPr>
                             </m:sSubPr>
@@ -9993,7 +10024,7 @@
                         <m:fPr>
                           <m:ctrlPr>
                             <a:rPr lang="en-US" sz="2400" i="1" smtClean="0">
-                              <a:latin typeface="Cambria Math" panose="02040503050406030204" pitchFamily="18" charset="0"/>
+                              <a:latin typeface="Cambria Math"/>
                             </a:rPr>
                           </m:ctrlPr>
                         </m:fPr>
@@ -10098,7 +10129,7 @@
                         <m:fPr>
                           <m:ctrlPr>
                             <a:rPr lang="en-US" sz="2400" i="1" smtClean="0">
-                              <a:latin typeface="Cambria Math" panose="02040503050406030204" pitchFamily="18" charset="0"/>
+                              <a:latin typeface="Cambria Math"/>
                             </a:rPr>
                           </m:ctrlPr>
                         </m:fPr>
@@ -10145,7 +10176,7 @@
                             <m:sSupPr>
                               <m:ctrlPr>
                                 <a:rPr lang="en-US" sz="2400" i="1" smtClean="0">
-                                  <a:latin typeface="Cambria Math" panose="02040503050406030204" pitchFamily="18" charset="0"/>
+                                  <a:latin typeface="Cambria Math"/>
                                 </a:rPr>
                               </m:ctrlPr>
                             </m:sSupPr>
@@ -10477,7 +10508,7 @@
                         <m:fPr>
                           <m:ctrlPr>
                             <a:rPr lang="en-US" sz="2800" i="1" smtClean="0">
-                              <a:latin typeface="Cambria Math" panose="02040503050406030204" pitchFamily="18" charset="0"/>
+                              <a:latin typeface="Cambria Math"/>
                             </a:rPr>
                           </m:ctrlPr>
                         </m:fPr>
@@ -10518,7 +10549,7 @@
                             <m:sSupPr>
                               <m:ctrlPr>
                                 <a:rPr lang="en-US" sz="2800" b="0" i="1" smtClean="0">
-                                  <a:latin typeface="Cambria Math" panose="02040503050406030204" pitchFamily="18" charset="0"/>
+                                  <a:latin typeface="Cambria Math"/>
                                 </a:rPr>
                               </m:ctrlPr>
                             </m:sSupPr>
@@ -10607,7 +10638,7 @@
                         <m:fPr>
                           <m:ctrlPr>
                             <a:rPr lang="en-US" sz="2800" b="0" i="1" smtClean="0">
-                              <a:latin typeface="Cambria Math" panose="02040503050406030204" pitchFamily="18" charset="0"/>
+                              <a:latin typeface="Cambria Math"/>
                             </a:rPr>
                           </m:ctrlPr>
                         </m:fPr>
@@ -10637,7 +10668,7 @@
                             <m:sSupPr>
                               <m:ctrlPr>
                                 <a:rPr lang="en-US" sz="2800" b="0" i="1" smtClean="0">
-                                  <a:latin typeface="Cambria Math" panose="02040503050406030204" pitchFamily="18" charset="0"/>
+                                  <a:latin typeface="Cambria Math"/>
                                   <a:ea typeface="Cambria Math" panose="02040503050406030204" pitchFamily="18" charset="0"/>
                                 </a:rPr>
                               </m:ctrlPr>
@@ -11376,7 +11407,7 @@
                         <m:fPr>
                           <m:ctrlPr>
                             <a:rPr lang="en-US" b="1" i="1" dirty="0" smtClean="0">
-                              <a:latin typeface="Cambria Math" panose="02040503050406030204" pitchFamily="18" charset="0"/>
+                              <a:latin typeface="Cambria Math"/>
                             </a:rPr>
                           </m:ctrlPr>
                         </m:fPr>
@@ -12873,7 +12904,7 @@
                         <m:fPr>
                           <m:ctrlPr>
                             <a:rPr lang="en-US" sz="2000" b="1" i="1" dirty="0" smtClean="0">
-                              <a:latin typeface="Cambria Math" panose="02040503050406030204" pitchFamily="18" charset="0"/>
+                              <a:latin typeface="Cambria Math"/>
                             </a:rPr>
                           </m:ctrlPr>
                         </m:fPr>
@@ -14230,7 +14261,7 @@
                             <a:solidFill>
                               <a:srgbClr val="C00000"/>
                             </a:solidFill>
-                            <a:latin typeface="Cambria Math" panose="02040503050406030204" pitchFamily="18" charset="0"/>
+                            <a:latin typeface="Cambria Math"/>
                           </a:rPr>
                         </m:ctrlPr>
                       </m:dPr>
@@ -14263,7 +14294,7 @@
                             <a:solidFill>
                               <a:srgbClr val="C00000"/>
                             </a:solidFill>
-                            <a:latin typeface="Cambria Math" panose="02040503050406030204" pitchFamily="18" charset="0"/>
+                            <a:latin typeface="Cambria Math"/>
                           </a:rPr>
                         </m:ctrlPr>
                       </m:radPr>
@@ -14332,7 +14363,7 @@
                             <a:solidFill>
                               <a:srgbClr val="C00000"/>
                             </a:solidFill>
-                            <a:latin typeface="Cambria Math" panose="02040503050406030204" pitchFamily="18" charset="0"/>
+                            <a:latin typeface="Cambria Math"/>
                           </a:rPr>
                         </m:ctrlPr>
                       </m:sSupPr>
@@ -15382,7 +15413,7 @@
         <p:cNvPr id="1" name="">
           <a:extLst>
             <a:ext uri="{FF2B5EF4-FFF2-40B4-BE49-F238E27FC236}">
-              <a16:creationId xmlns:a16="http://schemas.microsoft.com/office/drawing/2014/main" id="{56A797CB-0268-3133-8FCE-DA4565E5ED61}"/>
+              <a16:creationId xmlns:a16="http://schemas.microsoft.com/office/drawing/2014/main" xmlns="" id="{56A797CB-0268-3133-8FCE-DA4565E5ED61}"/>
             </a:ext>
           </a:extLst>
         </p:cNvPr>
@@ -15402,7 +15433,7 @@
           <p:cNvPr id="8" name="TextBox 7">
             <a:extLst>
               <a:ext uri="{FF2B5EF4-FFF2-40B4-BE49-F238E27FC236}">
-                <a16:creationId xmlns:a16="http://schemas.microsoft.com/office/drawing/2014/main" id="{4072D0FD-1E04-B940-627A-EA9DA05DCCCD}"/>
+                <a16:creationId xmlns:a16="http://schemas.microsoft.com/office/drawing/2014/main" xmlns="" id="{4072D0FD-1E04-B940-627A-EA9DA05DCCCD}"/>
               </a:ext>
             </a:extLst>
           </p:cNvPr>
@@ -15449,7 +15480,7 @@
           <p:cNvPr id="11" name="Rectangle 3">
             <a:extLst>
               <a:ext uri="{FF2B5EF4-FFF2-40B4-BE49-F238E27FC236}">
-                <a16:creationId xmlns:a16="http://schemas.microsoft.com/office/drawing/2014/main" id="{CD85C347-A663-4C54-28B7-AD7070B58688}"/>
+                <a16:creationId xmlns:a16="http://schemas.microsoft.com/office/drawing/2014/main" xmlns="" id="{CD85C347-A663-4C54-28B7-AD7070B58688}"/>
               </a:ext>
             </a:extLst>
           </p:cNvPr>
@@ -15677,7 +15708,7 @@
           <p:cNvPr id="3" name="TextBox 2">
             <a:extLst>
               <a:ext uri="{FF2B5EF4-FFF2-40B4-BE49-F238E27FC236}">
-                <a16:creationId xmlns:a16="http://schemas.microsoft.com/office/drawing/2014/main" id="{D8BEBB93-BF06-6A46-1070-A2F428228B2E}"/>
+                <a16:creationId xmlns:a16="http://schemas.microsoft.com/office/drawing/2014/main" xmlns="" id="{D8BEBB93-BF06-6A46-1070-A2F428228B2E}"/>
               </a:ext>
             </a:extLst>
           </p:cNvPr>
@@ -15724,7 +15755,7 @@
           <p:cNvPr id="4" name="Rectangle 3">
             <a:extLst>
               <a:ext uri="{FF2B5EF4-FFF2-40B4-BE49-F238E27FC236}">
-                <a16:creationId xmlns:a16="http://schemas.microsoft.com/office/drawing/2014/main" id="{1032A7C6-214E-21D6-A395-0CC71BAD27CA}"/>
+                <a16:creationId xmlns:a16="http://schemas.microsoft.com/office/drawing/2014/main" xmlns="" id="{1032A7C6-214E-21D6-A395-0CC71BAD27CA}"/>
               </a:ext>
             </a:extLst>
           </p:cNvPr>
@@ -16049,7 +16080,7 @@
         <p:spPr>
           <a:xfrm>
             <a:off x="950647" y="1402538"/>
-            <a:ext cx="4834261" cy="901465"/>
+            <a:ext cx="4834261" cy="1015663"/>
           </a:xfrm>
           <a:prstGeom prst="rect">
             <a:avLst/>
@@ -16085,7 +16116,7 @@
                   <a:noFill/>
                 </a:ln>
                 <a:solidFill>
-                  <a:srgbClr val="0000FF"/>
+                  <a:srgbClr val="00B050"/>
                 </a:solidFill>
                 <a:effectLst/>
                 <a:uLnTx/>
@@ -16403,7 +16434,7 @@
           <p:cNvPr id="5" name="مربع نص 1">
             <a:extLst>
               <a:ext uri="{FF2B5EF4-FFF2-40B4-BE49-F238E27FC236}">
-                <a16:creationId xmlns:a16="http://schemas.microsoft.com/office/drawing/2014/main" id="{7711DB52-DA0E-C95D-DFAF-CCC7BD2BE49D}"/>
+                <a16:creationId xmlns:a16="http://schemas.microsoft.com/office/drawing/2014/main" xmlns="" id="{7711DB52-DA0E-C95D-DFAF-CCC7BD2BE49D}"/>
               </a:ext>
             </a:extLst>
           </p:cNvPr>
@@ -16413,7 +16444,7 @@
         <p:spPr>
           <a:xfrm>
             <a:off x="950647" y="3327475"/>
-            <a:ext cx="4834261" cy="901465"/>
+            <a:ext cx="4834261" cy="1015663"/>
           </a:xfrm>
           <a:prstGeom prst="rect">
             <a:avLst/>
@@ -16449,7 +16480,7 @@
                   <a:noFill/>
                 </a:ln>
                 <a:solidFill>
-                  <a:srgbClr val="0000FF"/>
+                  <a:srgbClr val="00B050"/>
                 </a:solidFill>
                 <a:effectLst/>
                 <a:uLnTx/>
@@ -16468,7 +16499,7 @@
           <p:cNvPr id="6" name="TextBox 5">
             <a:extLst>
               <a:ext uri="{FF2B5EF4-FFF2-40B4-BE49-F238E27FC236}">
-                <a16:creationId xmlns:a16="http://schemas.microsoft.com/office/drawing/2014/main" id="{C6E955C2-410D-5EE0-CFAB-8FE55D451121}"/>
+                <a16:creationId xmlns:a16="http://schemas.microsoft.com/office/drawing/2014/main" xmlns="" id="{C6E955C2-410D-5EE0-CFAB-8FE55D451121}"/>
               </a:ext>
             </a:extLst>
           </p:cNvPr>
@@ -16557,7 +16588,7 @@
           <p:cNvPr id="7" name="مربع نص 1">
             <a:extLst>
               <a:ext uri="{FF2B5EF4-FFF2-40B4-BE49-F238E27FC236}">
-                <a16:creationId xmlns:a16="http://schemas.microsoft.com/office/drawing/2014/main" id="{0D13F05B-E0BB-BBD5-3036-3CD8AF11701C}"/>
+                <a16:creationId xmlns:a16="http://schemas.microsoft.com/office/drawing/2014/main" xmlns="" id="{0D13F05B-E0BB-BBD5-3036-3CD8AF11701C}"/>
               </a:ext>
             </a:extLst>
           </p:cNvPr>
@@ -16567,7 +16598,7 @@
         <p:spPr>
           <a:xfrm>
             <a:off x="352959" y="0"/>
-            <a:ext cx="4834261" cy="901465"/>
+            <a:ext cx="4834261" cy="1015663"/>
           </a:xfrm>
           <a:prstGeom prst="rect">
             <a:avLst/>
@@ -16603,7 +16634,7 @@
                   <a:noFill/>
                 </a:ln>
                 <a:solidFill>
-                  <a:srgbClr val="0000FF"/>
+                  <a:srgbClr val="00B050"/>
                 </a:solidFill>
                 <a:effectLst/>
                 <a:uLnTx/>
@@ -16622,7 +16653,7 @@
           <p:cNvPr id="8" name="TextBox 7">
             <a:extLst>
               <a:ext uri="{FF2B5EF4-FFF2-40B4-BE49-F238E27FC236}">
-                <a16:creationId xmlns:a16="http://schemas.microsoft.com/office/drawing/2014/main" id="{177A08A1-3077-EFAA-78CE-457C01609972}"/>
+                <a16:creationId xmlns:a16="http://schemas.microsoft.com/office/drawing/2014/main" xmlns="" id="{177A08A1-3077-EFAA-78CE-457C01609972}"/>
               </a:ext>
             </a:extLst>
           </p:cNvPr>
@@ -16778,7 +16809,7 @@
             <a:r>
               <a:rPr lang="en-US" sz="4000" b="1" dirty="0">
                 <a:solidFill>
-                  <a:srgbClr val="0000FF"/>
+                  <a:srgbClr val="00B050"/>
                 </a:solidFill>
                 <a:latin typeface="Cambria" panose="02040503050406030204" pitchFamily="18" charset="0"/>
               </a:rPr>
@@ -17769,7 +17800,7 @@
                           <m:fPr>
                             <m:ctrlPr>
                               <a:rPr lang="en-US" b="1" i="1" dirty="0" smtClean="0">
-                                <a:latin typeface="Cambria Math" panose="02040503050406030204" pitchFamily="18" charset="0"/>
+                                <a:latin typeface="Cambria Math"/>
                               </a:rPr>
                             </m:ctrlPr>
                           </m:fPr>
@@ -18018,7 +18049,7 @@
             <a:r>
               <a:rPr lang="en-US" sz="4000" b="1" i="1" dirty="0">
                 <a:solidFill>
-                  <a:srgbClr val="0000FF"/>
+                  <a:srgbClr val="00B050"/>
                 </a:solidFill>
                 <a:latin typeface="Cambria" panose="02040503050406030204" pitchFamily="18" charset="0"/>
               </a:rPr>
@@ -18093,7 +18124,7 @@
                             <a:solidFill>
                               <a:srgbClr val="C00000"/>
                             </a:solidFill>
-                            <a:latin typeface="Cambria Math" panose="02040503050406030204" pitchFamily="18" charset="0"/>
+                            <a:latin typeface="Cambria Math"/>
                           </a:rPr>
                         </m:ctrlPr>
                       </m:sSubPr>
@@ -18127,7 +18158,7 @@
                             <a:solidFill>
                               <a:srgbClr val="C00000"/>
                             </a:solidFill>
-                            <a:latin typeface="Cambria Math" panose="02040503050406030204" pitchFamily="18" charset="0"/>
+                            <a:latin typeface="Cambria Math"/>
                           </a:rPr>
                         </m:ctrlPr>
                       </m:dPr>
@@ -18789,7 +18820,7 @@
                       <m:sSubPr>
                         <m:ctrlPr>
                           <a:rPr lang="en-US" sz="2800" i="1" smtClean="0">
-                            <a:latin typeface="Cambria Math" panose="02040503050406030204" pitchFamily="18" charset="0"/>
+                            <a:latin typeface="Cambria Math"/>
                             <a:ea typeface="Cambria Math" panose="02040503050406030204" pitchFamily="18" charset="0"/>
                           </a:rPr>
                         </m:ctrlPr>
@@ -18817,7 +18848,7 @@
                       <m:dPr>
                         <m:ctrlPr>
                           <a:rPr lang="en-US" sz="2800" i="1">
-                            <a:latin typeface="Cambria Math" panose="02040503050406030204" pitchFamily="18" charset="0"/>
+                            <a:latin typeface="Cambria Math"/>
                             <a:ea typeface="Cambria Math" panose="02040503050406030204" pitchFamily="18" charset="0"/>
                           </a:rPr>
                         </m:ctrlPr>
@@ -18843,7 +18874,7 @@
                       <m:fPr>
                         <m:ctrlPr>
                           <a:rPr lang="en-US" sz="2800" i="1">
-                            <a:latin typeface="Cambria Math" panose="02040503050406030204" pitchFamily="18" charset="0"/>
+                            <a:latin typeface="Cambria Math"/>
                             <a:ea typeface="Cambria Math" panose="02040503050406030204" pitchFamily="18" charset="0"/>
                           </a:rPr>
                         </m:ctrlPr>
@@ -18899,7 +18930,7 @@
                       <m:fPr>
                         <m:ctrlPr>
                           <a:rPr lang="en-US" sz="2800" i="1" dirty="0">
-                            <a:latin typeface="Cambria Math" panose="02040503050406030204" pitchFamily="18" charset="0"/>
+                            <a:latin typeface="Cambria Math"/>
                             <a:ea typeface="Cambria Math" panose="02040503050406030204" pitchFamily="18" charset="0"/>
                           </a:rPr>
                         </m:ctrlPr>
@@ -18966,7 +18997,7 @@
                             <a:solidFill>
                               <a:srgbClr val="0000FF"/>
                             </a:solidFill>
-                            <a:latin typeface="Cambria Math" panose="02040503050406030204" pitchFamily="18" charset="0"/>
+                            <a:latin typeface="Cambria Math"/>
                             <a:ea typeface="Cambria Math" panose="02040503050406030204" pitchFamily="18" charset="0"/>
                           </a:rPr>
                         </m:ctrlPr>
@@ -19003,7 +19034,7 @@
                             <a:solidFill>
                               <a:srgbClr val="0000FF"/>
                             </a:solidFill>
-                            <a:latin typeface="Cambria Math" panose="02040503050406030204" pitchFamily="18" charset="0"/>
+                            <a:latin typeface="Cambria Math"/>
                             <a:ea typeface="Cambria Math" panose="02040503050406030204" pitchFamily="18" charset="0"/>
                           </a:rPr>
                         </m:ctrlPr>
@@ -19043,7 +19074,7 @@
                       <m:fPr>
                         <m:ctrlPr>
                           <a:rPr lang="en-US" sz="2800" i="1" smtClean="0">
-                            <a:latin typeface="Cambria Math" panose="02040503050406030204" pitchFamily="18" charset="0"/>
+                            <a:latin typeface="Cambria Math"/>
                             <a:ea typeface="Cambria Math" panose="02040503050406030204" pitchFamily="18" charset="0"/>
                           </a:rPr>
                         </m:ctrlPr>
@@ -19092,7 +19123,7 @@
                       <m:fPr>
                         <m:ctrlPr>
                           <a:rPr lang="en-US" sz="2800" b="0" i="1" smtClean="0">
-                            <a:latin typeface="Cambria Math" panose="02040503050406030204" pitchFamily="18" charset="0"/>
+                            <a:latin typeface="Cambria Math"/>
                             <a:ea typeface="Cambria Math" panose="02040503050406030204" pitchFamily="18" charset="0"/>
                           </a:rPr>
                         </m:ctrlPr>
@@ -19155,7 +19186,7 @@
                             <a:solidFill>
                               <a:srgbClr val="0000FF"/>
                             </a:solidFill>
-                            <a:latin typeface="Cambria Math" panose="02040503050406030204" pitchFamily="18" charset="0"/>
+                            <a:latin typeface="Cambria Math"/>
                             <a:ea typeface="Cambria Math" panose="02040503050406030204" pitchFamily="18" charset="0"/>
                           </a:rPr>
                         </m:ctrlPr>
@@ -19242,7 +19273,7 @@
                             <a:solidFill>
                               <a:srgbClr val="0000FF"/>
                             </a:solidFill>
-                            <a:latin typeface="Cambria Math" panose="02040503050406030204" pitchFamily="18" charset="0"/>
+                            <a:latin typeface="Cambria Math"/>
                             <a:ea typeface="Cambria Math" panose="02040503050406030204" pitchFamily="18" charset="0"/>
                           </a:rPr>
                         </m:ctrlPr>
@@ -20316,7 +20347,7 @@
                           <m:fPr>
                             <m:ctrlPr>
                               <a:rPr lang="en-US" b="1" i="1" dirty="0" smtClean="0">
-                                <a:latin typeface="Cambria Math" panose="02040503050406030204" pitchFamily="18" charset="0"/>
+                                <a:latin typeface="Cambria Math"/>
                               </a:rPr>
                             </m:ctrlPr>
                           </m:fPr>
@@ -21474,7 +21505,7 @@
                         <m:sSubPr>
                           <m:ctrlPr>
                             <a:rPr lang="en-US" sz="2000" b="1" i="1" smtClean="0">
-                              <a:latin typeface="Cambria Math" panose="02040503050406030204" pitchFamily="18" charset="0"/>
+                              <a:latin typeface="Cambria Math"/>
                             </a:rPr>
                           </m:ctrlPr>
                         </m:sSubPr>
@@ -21499,7 +21530,7 @@
                         <m:dPr>
                           <m:ctrlPr>
                             <a:rPr lang="en-US" sz="2000" b="1" i="1" smtClean="0">
-                              <a:latin typeface="Cambria Math" panose="02040503050406030204" pitchFamily="18" charset="0"/>
+                              <a:latin typeface="Cambria Math"/>
                             </a:rPr>
                           </m:ctrlPr>
                         </m:dPr>
@@ -21642,7 +21673,7 @@
                         <m:sSupPr>
                           <m:ctrlPr>
                             <a:rPr lang="en-US" sz="2000" b="1" i="1" smtClean="0">
-                              <a:latin typeface="Cambria Math" panose="02040503050406030204" pitchFamily="18" charset="0"/>
+                              <a:latin typeface="Cambria Math"/>
                             </a:rPr>
                           </m:ctrlPr>
                         </m:sSupPr>
@@ -21914,7 +21945,7 @@
                         <m:sSubPr>
                           <m:ctrlPr>
                             <a:rPr lang="en-US" sz="2000" b="1" i="1" dirty="0" smtClean="0">
-                              <a:latin typeface="Cambria Math" panose="02040503050406030204" pitchFamily="18" charset="0"/>
+                              <a:latin typeface="Cambria Math"/>
                             </a:rPr>
                           </m:ctrlPr>
                         </m:sSubPr>
@@ -22340,7 +22371,7 @@
                         <m:fPr>
                           <m:ctrlPr>
                             <a:rPr lang="en-US" sz="2000" b="1" i="1" smtClean="0">
-                              <a:latin typeface="Cambria Math" panose="02040503050406030204" pitchFamily="18" charset="0"/>
+                              <a:latin typeface="Cambria Math"/>
                             </a:rPr>
                           </m:ctrlPr>
                         </m:fPr>
@@ -22594,7 +22625,7 @@
                         <m:fPr>
                           <m:ctrlPr>
                             <a:rPr lang="en-US" sz="2000" b="1" i="1" smtClean="0">
-                              <a:latin typeface="Cambria Math" panose="02040503050406030204" pitchFamily="18" charset="0"/>
+                              <a:latin typeface="Cambria Math"/>
                             </a:rPr>
                           </m:ctrlPr>
                         </m:fPr>
@@ -22611,7 +22642,7 @@
                             <m:sSubSupPr>
                               <m:ctrlPr>
                                 <a:rPr lang="en-US" sz="2000" b="1" i="1" smtClean="0">
-                                  <a:latin typeface="Cambria Math" panose="02040503050406030204" pitchFamily="18" charset="0"/>
+                                  <a:latin typeface="Cambria Math"/>
                                 </a:rPr>
                               </m:ctrlPr>
                             </m:sSubSupPr>
@@ -22682,7 +22713,7 @@
                         <m:sSupPr>
                           <m:ctrlPr>
                             <a:rPr lang="en-US" sz="2000" b="1" i="1" smtClean="0">
-                              <a:latin typeface="Cambria Math" panose="02040503050406030204" pitchFamily="18" charset="0"/>
+                              <a:latin typeface="Cambria Math"/>
                             </a:rPr>
                           </m:ctrlPr>
                         </m:sSupPr>
@@ -22799,7 +22830,7 @@
                               <a:solidFill>
                                 <a:prstClr val="black"/>
                               </a:solidFill>
-                              <a:latin typeface="Cambria Math" panose="02040503050406030204" pitchFamily="18" charset="0"/>
+                              <a:latin typeface="Cambria Math"/>
                             </a:rPr>
                           </m:ctrlPr>
                         </m:sSubSupPr>
@@ -22843,7 +22874,7 @@
                               <a:solidFill>
                                 <a:prstClr val="black"/>
                               </a:solidFill>
-                              <a:latin typeface="Cambria Math" panose="02040503050406030204" pitchFamily="18" charset="0"/>
+                              <a:latin typeface="Cambria Math"/>
                             </a:rPr>
                           </m:ctrlPr>
                         </m:fPr>
@@ -22867,7 +22898,7 @@
                                   <a:solidFill>
                                     <a:prstClr val="black"/>
                                   </a:solidFill>
-                                  <a:latin typeface="Cambria Math" panose="02040503050406030204" pitchFamily="18" charset="0"/>
+                                  <a:latin typeface="Cambria Math"/>
                                 </a:rPr>
                               </m:ctrlPr>
                             </m:radPr>
@@ -22999,7 +23030,7 @@
                         <m:sSubPr>
                           <m:ctrlPr>
                             <a:rPr lang="en-US" sz="2000" b="1" i="1" dirty="0" smtClean="0">
-                              <a:latin typeface="Cambria Math" panose="02040503050406030204" pitchFamily="18" charset="0"/>
+                              <a:latin typeface="Cambria Math"/>
                             </a:rPr>
                           </m:ctrlPr>
                         </m:sSubPr>
@@ -23563,7 +23594,7 @@
                         <m:fPr>
                           <m:ctrlPr>
                             <a:rPr lang="en-US" sz="2000" b="1" i="1" smtClean="0">
-                              <a:latin typeface="Cambria Math" panose="02040503050406030204" pitchFamily="18" charset="0"/>
+                              <a:latin typeface="Cambria Math"/>
                             </a:rPr>
                           </m:ctrlPr>
                         </m:fPr>
@@ -25815,13 +25846,28 @@
   <a:extraClrSchemeLst/>
   <a:extLst>
     <a:ext uri="{05A4C25C-085E-4340-85A3-A5531E510DB2}">
-      <thm15:themeFamily xmlns:thm15="http://schemas.microsoft.com/office/thememl/2012/main" name="Office Theme" id="{2E142A2C-CD16-42D6-873A-C26D2A0506FA}" vid="{1BDDFF52-6CD6-40A5-AB3C-68EB2F1E4D0A}"/>
+      <thm15:themeFamily xmlns:thm15="http://schemas.microsoft.com/office/thememl/2012/main" xmlns="" name="Office Theme" id="{2E142A2C-CD16-42D6-873A-C26D2A0506FA}" vid="{1BDDFF52-6CD6-40A5-AB3C-68EB2F1E4D0A}"/>
     </a:ext>
   </a:extLst>
 </a:theme>
 </file>
 
 <file path=customXml/item1.xml><?xml version="1.0" encoding="utf-8"?>
+<?mso-contentType ?>
+<FormTemplates xmlns="http://schemas.microsoft.com/sharepoint/v3/contenttype/forms">
+  <Display>DocumentLibraryForm</Display>
+  <Edit>DocumentLibraryForm</Edit>
+  <New>DocumentLibraryForm</New>
+</FormTemplates>
+</file>
+
+<file path=customXml/item2.xml><?xml version="1.0" encoding="utf-8"?>
+<p:properties xmlns:p="http://schemas.microsoft.com/office/2006/metadata/properties" xmlns:xsi="http://www.w3.org/2001/XMLSchema-instance" xmlns:pc="http://schemas.microsoft.com/office/infopath/2007/PartnerControls">
+  <documentManagement/>
+</p:properties>
+</file>
+
+<file path=customXml/item3.xml><?xml version="1.0" encoding="utf-8"?>
 <ct:contentTypeSchema xmlns:ct="http://schemas.microsoft.com/office/2006/metadata/contentType" xmlns:ma="http://schemas.microsoft.com/office/2006/metadata/properties/metaAttributes" ct:_="" ma:_="" ma:contentTypeName="Document" ma:contentTypeID="0x010100425FE36DD6C47448A3CBFB1BADCF4FE3" ma:contentTypeVersion="2" ma:contentTypeDescription="Create a new document." ma:contentTypeScope="" ma:versionID="7b1696c79dc6f61b53a8fb6d8fc307cc">
   <xsd:schema xmlns:xsd="http://www.w3.org/2001/XMLSchema" xmlns:xs="http://www.w3.org/2001/XMLSchema" xmlns:p="http://schemas.microsoft.com/office/2006/metadata/properties" xmlns:ns2="b62f0795-c210-4e71-b1b4-24a58bc169d4" targetNamespace="http://schemas.microsoft.com/office/2006/metadata/properties" ma:root="true" ma:fieldsID="d0fdc97d0e14884c3428e9f0e28ee0ca" ns2:_="">
     <xsd:import namespace="b62f0795-c210-4e71-b1b4-24a58bc169d4"/>
@@ -25953,22 +25999,24 @@
 </ct:contentTypeSchema>
 </file>
 
-<file path=customXml/item2.xml><?xml version="1.0" encoding="utf-8"?>
-<p:properties xmlns:p="http://schemas.microsoft.com/office/2006/metadata/properties" xmlns:xsi="http://www.w3.org/2001/XMLSchema-instance" xmlns:pc="http://schemas.microsoft.com/office/infopath/2007/PartnerControls">
-  <documentManagement/>
-</p:properties>
+<file path=customXml/itemProps1.xml><?xml version="1.0" encoding="utf-8"?>
+<ds:datastoreItem xmlns:ds="http://schemas.openxmlformats.org/officeDocument/2006/customXml" ds:itemID="{83294D05-B8C6-4276-8318-021BA62FE338}">
+  <ds:schemaRefs>
+    <ds:schemaRef ds:uri="http://schemas.microsoft.com/sharepoint/v3/contenttype/forms"/>
+  </ds:schemaRefs>
+</ds:datastoreItem>
 </file>
 
-<file path=customXml/item3.xml><?xml version="1.0" encoding="utf-8"?>
-<?mso-contentType ?>
-<FormTemplates xmlns="http://schemas.microsoft.com/sharepoint/v3/contenttype/forms">
-  <Display>DocumentLibraryForm</Display>
-  <Edit>DocumentLibraryForm</Edit>
-  <New>DocumentLibraryForm</New>
-</FormTemplates>
+<file path=customXml/itemProps2.xml><?xml version="1.0" encoding="utf-8"?>
+<ds:datastoreItem xmlns:ds="http://schemas.openxmlformats.org/officeDocument/2006/customXml" ds:itemID="{FD6DD510-F663-4F5F-99B3-C79303728BD2}">
+  <ds:schemaRefs>
+    <ds:schemaRef ds:uri="http://schemas.microsoft.com/office/2006/metadata/properties"/>
+    <ds:schemaRef ds:uri="http://schemas.microsoft.com/office/infopath/2007/PartnerControls"/>
+  </ds:schemaRefs>
+</ds:datastoreItem>
 </file>
 
-<file path=customXml/itemProps1.xml><?xml version="1.0" encoding="utf-8"?>
+<file path=customXml/itemProps3.xml><?xml version="1.0" encoding="utf-8"?>
 <ds:datastoreItem xmlns:ds="http://schemas.openxmlformats.org/officeDocument/2006/customXml" ds:itemID="{759FB533-F5FC-473E-A160-0DFEE7406831}">
   <ds:schemaRefs>
     <ds:schemaRef ds:uri="http://schemas.microsoft.com/office/2006/metadata/contentType"/>
@@ -25984,21 +26032,4 @@
     <ds:schemaRef ds:uri="http://schemas.microsoft.com/internal/obd"/>
   </ds:schemaRefs>
 </ds:datastoreItem>
-</file>
-
-<file path=customXml/itemProps2.xml><?xml version="1.0" encoding="utf-8"?>
-<ds:datastoreItem xmlns:ds="http://schemas.openxmlformats.org/officeDocument/2006/customXml" ds:itemID="{FD6DD510-F663-4F5F-99B3-C79303728BD2}">
-  <ds:schemaRefs>
-    <ds:schemaRef ds:uri="http://schemas.microsoft.com/office/2006/metadata/properties"/>
-    <ds:schemaRef ds:uri="http://schemas.microsoft.com/office/infopath/2007/PartnerControls"/>
-  </ds:schemaRefs>
-</ds:datastoreItem>
-</file>
-
-<file path=customXml/itemProps3.xml><?xml version="1.0" encoding="utf-8"?>
-<ds:datastoreItem xmlns:ds="http://schemas.openxmlformats.org/officeDocument/2006/customXml" ds:itemID="{83294D05-B8C6-4276-8318-021BA62FE338}">
-  <ds:schemaRefs>
-    <ds:schemaRef ds:uri="http://schemas.microsoft.com/sharepoint/v3/contenttype/forms"/>
-  </ds:schemaRefs>
-</ds:datastoreItem>
 </file>
</xml_diff>